<commit_message>
Upload result feature selected and histogram using R language
</commit_message>
<xml_diff>
--- a/report/gene-images.pptx
+++ b/report/gene-images.pptx
@@ -12,6 +12,9 @@
     <p:sldId id="260" r:id="rId6"/>
     <p:sldId id="261" r:id="rId7"/>
     <p:sldId id="262" r:id="rId8"/>
+    <p:sldId id="263" r:id="rId9"/>
+    <p:sldId id="265" r:id="rId10"/>
+    <p:sldId id="264" r:id="rId11"/>
   </p:sldIdLst>
   <p:sldSz cx="12192000" cy="6858000"/>
   <p:notesSz cx="6858000" cy="9144000"/>
@@ -266,7 +269,7 @@
           <a:lstStyle/>
           <a:p>
             <a:fld id="{C5D5A828-656F-CB49-A26A-EF571FB76BD5}" type="datetimeFigureOut">
-              <a:t>2/28/20</a:t>
+              <a:t>3/1/20</a:t>
             </a:fld>
             <a:endParaRPr lang="en-VN"/>
           </a:p>
@@ -464,7 +467,7 @@
           <a:lstStyle/>
           <a:p>
             <a:fld id="{C5D5A828-656F-CB49-A26A-EF571FB76BD5}" type="datetimeFigureOut">
-              <a:t>2/28/20</a:t>
+              <a:t>3/1/20</a:t>
             </a:fld>
             <a:endParaRPr lang="en-VN"/>
           </a:p>
@@ -672,7 +675,7 @@
           <a:lstStyle/>
           <a:p>
             <a:fld id="{C5D5A828-656F-CB49-A26A-EF571FB76BD5}" type="datetimeFigureOut">
-              <a:t>2/28/20</a:t>
+              <a:t>3/1/20</a:t>
             </a:fld>
             <a:endParaRPr lang="en-VN"/>
           </a:p>
@@ -870,7 +873,7 @@
           <a:lstStyle/>
           <a:p>
             <a:fld id="{C5D5A828-656F-CB49-A26A-EF571FB76BD5}" type="datetimeFigureOut">
-              <a:t>2/28/20</a:t>
+              <a:t>3/1/20</a:t>
             </a:fld>
             <a:endParaRPr lang="en-VN"/>
           </a:p>
@@ -1144,7 +1147,7 @@
           <a:lstStyle/>
           <a:p>
             <a:fld id="{C5D5A828-656F-CB49-A26A-EF571FB76BD5}" type="datetimeFigureOut">
-              <a:t>2/28/20</a:t>
+              <a:t>3/1/20</a:t>
             </a:fld>
             <a:endParaRPr lang="en-VN"/>
           </a:p>
@@ -1410,7 +1413,7 @@
           <a:lstStyle/>
           <a:p>
             <a:fld id="{C5D5A828-656F-CB49-A26A-EF571FB76BD5}" type="datetimeFigureOut">
-              <a:t>2/28/20</a:t>
+              <a:t>3/1/20</a:t>
             </a:fld>
             <a:endParaRPr lang="en-VN"/>
           </a:p>
@@ -1823,7 +1826,7 @@
           <a:lstStyle/>
           <a:p>
             <a:fld id="{C5D5A828-656F-CB49-A26A-EF571FB76BD5}" type="datetimeFigureOut">
-              <a:t>2/28/20</a:t>
+              <a:t>3/1/20</a:t>
             </a:fld>
             <a:endParaRPr lang="en-VN"/>
           </a:p>
@@ -1963,7 +1966,7 @@
           <a:lstStyle/>
           <a:p>
             <a:fld id="{C5D5A828-656F-CB49-A26A-EF571FB76BD5}" type="datetimeFigureOut">
-              <a:t>2/28/20</a:t>
+              <a:t>3/1/20</a:t>
             </a:fld>
             <a:endParaRPr lang="en-VN"/>
           </a:p>
@@ -2074,7 +2077,7 @@
           <a:lstStyle/>
           <a:p>
             <a:fld id="{C5D5A828-656F-CB49-A26A-EF571FB76BD5}" type="datetimeFigureOut">
-              <a:t>2/28/20</a:t>
+              <a:t>3/1/20</a:t>
             </a:fld>
             <a:endParaRPr lang="en-VN"/>
           </a:p>
@@ -2385,7 +2388,7 @@
           <a:lstStyle/>
           <a:p>
             <a:fld id="{C5D5A828-656F-CB49-A26A-EF571FB76BD5}" type="datetimeFigureOut">
-              <a:t>2/28/20</a:t>
+              <a:t>3/1/20</a:t>
             </a:fld>
             <a:endParaRPr lang="en-VN"/>
           </a:p>
@@ -2672,7 +2675,7 @@
           <a:lstStyle/>
           <a:p>
             <a:fld id="{C5D5A828-656F-CB49-A26A-EF571FB76BD5}" type="datetimeFigureOut">
-              <a:t>2/28/20</a:t>
+              <a:t>3/1/20</a:t>
             </a:fld>
             <a:endParaRPr lang="en-VN"/>
           </a:p>
@@ -2913,7 +2916,7 @@
           </a:lstStyle>
           <a:p>
             <a:fld id="{C5D5A828-656F-CB49-A26A-EF571FB76BD5}" type="datetimeFigureOut">
-              <a:t>2/28/20</a:t>
+              <a:t>3/1/20</a:t>
             </a:fld>
             <a:endParaRPr lang="en-VN"/>
           </a:p>
@@ -3513,6 +3516,96 @@
     <p:extLst>
       <p:ext uri="{BB962C8B-B14F-4D97-AF65-F5344CB8AC3E}">
         <p14:creationId xmlns:p14="http://schemas.microsoft.com/office/powerpoint/2010/main" val="2866811900"/>
+      </p:ext>
+    </p:extLst>
+  </p:cSld>
+  <p:clrMapOvr>
+    <a:masterClrMapping/>
+  </p:clrMapOvr>
+</p:sld>
+</file>
+
+<file path=ppt/slides/slide10.xml><?xml version="1.0" encoding="utf-8"?>
+<p:sld xmlns:a="http://schemas.openxmlformats.org/drawingml/2006/main" xmlns:r="http://schemas.openxmlformats.org/officeDocument/2006/relationships" xmlns:p="http://schemas.openxmlformats.org/presentationml/2006/main">
+  <p:cSld>
+    <p:spTree>
+      <p:nvGrpSpPr>
+        <p:cNvPr id="1" name=""/>
+        <p:cNvGrpSpPr/>
+        <p:nvPr/>
+      </p:nvGrpSpPr>
+      <p:grpSpPr>
+        <a:xfrm>
+          <a:off x="0" y="0"/>
+          <a:ext cx="0" cy="0"/>
+          <a:chOff x="0" y="0"/>
+          <a:chExt cx="0" cy="0"/>
+        </a:xfrm>
+      </p:grpSpPr>
+      <p:pic>
+        <p:nvPicPr>
+          <p:cNvPr id="9" name="Picture 8">
+            <a:extLst>
+              <a:ext uri="{FF2B5EF4-FFF2-40B4-BE49-F238E27FC236}">
+                <a16:creationId xmlns:a16="http://schemas.microsoft.com/office/drawing/2014/main" id="{8080C922-3E51-B046-A89F-9E809DD71D36}"/>
+              </a:ext>
+            </a:extLst>
+          </p:cNvPr>
+          <p:cNvPicPr>
+            <a:picLocks noChangeAspect="1"/>
+          </p:cNvPicPr>
+          <p:nvPr/>
+        </p:nvPicPr>
+        <p:blipFill>
+          <a:blip r:embed="rId2"/>
+          <a:stretch>
+            <a:fillRect/>
+          </a:stretch>
+        </p:blipFill>
+        <p:spPr>
+          <a:xfrm>
+            <a:off x="6096000" y="1710587"/>
+            <a:ext cx="5523470" cy="3436826"/>
+          </a:xfrm>
+          <a:prstGeom prst="rect">
+            <a:avLst/>
+          </a:prstGeom>
+        </p:spPr>
+      </p:pic>
+      <p:pic>
+        <p:nvPicPr>
+          <p:cNvPr id="10" name="Picture 9">
+            <a:extLst>
+              <a:ext uri="{FF2B5EF4-FFF2-40B4-BE49-F238E27FC236}">
+                <a16:creationId xmlns:a16="http://schemas.microsoft.com/office/drawing/2014/main" id="{127D6DDB-4885-E642-94E5-F9023A3E47CA}"/>
+              </a:ext>
+            </a:extLst>
+          </p:cNvPr>
+          <p:cNvPicPr>
+            <a:picLocks noChangeAspect="1"/>
+          </p:cNvPicPr>
+          <p:nvPr/>
+        </p:nvPicPr>
+        <p:blipFill>
+          <a:blip r:embed="rId3"/>
+          <a:stretch>
+            <a:fillRect/>
+          </a:stretch>
+        </p:blipFill>
+        <p:spPr>
+          <a:xfrm>
+            <a:off x="427811" y="1718413"/>
+            <a:ext cx="5486400" cy="3429000"/>
+          </a:xfrm>
+          <a:prstGeom prst="rect">
+            <a:avLst/>
+          </a:prstGeom>
+        </p:spPr>
+      </p:pic>
+    </p:spTree>
+    <p:extLst>
+      <p:ext uri="{BB962C8B-B14F-4D97-AF65-F5344CB8AC3E}">
+        <p14:creationId xmlns:p14="http://schemas.microsoft.com/office/powerpoint/2010/main" val="1256629835"/>
       </p:ext>
     </p:extLst>
   </p:cSld>
@@ -9505,6 +9598,186 @@
 </p:sld>
 </file>
 
+<file path=ppt/slides/slide8.xml><?xml version="1.0" encoding="utf-8"?>
+<p:sld xmlns:a="http://schemas.openxmlformats.org/drawingml/2006/main" xmlns:r="http://schemas.openxmlformats.org/officeDocument/2006/relationships" xmlns:p="http://schemas.openxmlformats.org/presentationml/2006/main">
+  <p:cSld>
+    <p:spTree>
+      <p:nvGrpSpPr>
+        <p:cNvPr id="1" name=""/>
+        <p:cNvGrpSpPr/>
+        <p:nvPr/>
+      </p:nvGrpSpPr>
+      <p:grpSpPr>
+        <a:xfrm>
+          <a:off x="0" y="0"/>
+          <a:ext cx="0" cy="0"/>
+          <a:chOff x="0" y="0"/>
+          <a:chExt cx="0" cy="0"/>
+        </a:xfrm>
+      </p:grpSpPr>
+      <p:pic>
+        <p:nvPicPr>
+          <p:cNvPr id="11" name="Picture 10">
+            <a:extLst>
+              <a:ext uri="{FF2B5EF4-FFF2-40B4-BE49-F238E27FC236}">
+                <a16:creationId xmlns:a16="http://schemas.microsoft.com/office/drawing/2014/main" id="{00404070-3DA6-854C-8B4A-2C19018D04F9}"/>
+              </a:ext>
+            </a:extLst>
+          </p:cNvPr>
+          <p:cNvPicPr>
+            <a:picLocks noChangeAspect="1"/>
+          </p:cNvPicPr>
+          <p:nvPr/>
+        </p:nvPicPr>
+        <p:blipFill>
+          <a:blip r:embed="rId2"/>
+          <a:stretch>
+            <a:fillRect/>
+          </a:stretch>
+        </p:blipFill>
+        <p:spPr>
+          <a:xfrm>
+            <a:off x="366165" y="1714500"/>
+            <a:ext cx="5548045" cy="3429000"/>
+          </a:xfrm>
+          <a:prstGeom prst="rect">
+            <a:avLst/>
+          </a:prstGeom>
+        </p:spPr>
+      </p:pic>
+      <p:pic>
+        <p:nvPicPr>
+          <p:cNvPr id="12" name="Picture 11">
+            <a:extLst>
+              <a:ext uri="{FF2B5EF4-FFF2-40B4-BE49-F238E27FC236}">
+                <a16:creationId xmlns:a16="http://schemas.microsoft.com/office/drawing/2014/main" id="{CBE4CD19-2132-0D40-BDC1-4F1602FEA008}"/>
+              </a:ext>
+            </a:extLst>
+          </p:cNvPr>
+          <p:cNvPicPr>
+            <a:picLocks noChangeAspect="1"/>
+          </p:cNvPicPr>
+          <p:nvPr/>
+        </p:nvPicPr>
+        <p:blipFill>
+          <a:blip r:embed="rId3"/>
+          <a:stretch>
+            <a:fillRect/>
+          </a:stretch>
+        </p:blipFill>
+        <p:spPr>
+          <a:xfrm>
+            <a:off x="6096000" y="1714500"/>
+            <a:ext cx="5486400" cy="3429000"/>
+          </a:xfrm>
+          <a:prstGeom prst="rect">
+            <a:avLst/>
+          </a:prstGeom>
+        </p:spPr>
+      </p:pic>
+    </p:spTree>
+    <p:extLst>
+      <p:ext uri="{BB962C8B-B14F-4D97-AF65-F5344CB8AC3E}">
+        <p14:creationId xmlns:p14="http://schemas.microsoft.com/office/powerpoint/2010/main" val="4096195565"/>
+      </p:ext>
+    </p:extLst>
+  </p:cSld>
+  <p:clrMapOvr>
+    <a:masterClrMapping/>
+  </p:clrMapOvr>
+</p:sld>
+</file>
+
+<file path=ppt/slides/slide9.xml><?xml version="1.0" encoding="utf-8"?>
+<p:sld xmlns:a="http://schemas.openxmlformats.org/drawingml/2006/main" xmlns:r="http://schemas.openxmlformats.org/officeDocument/2006/relationships" xmlns:p="http://schemas.openxmlformats.org/presentationml/2006/main">
+  <p:cSld>
+    <p:spTree>
+      <p:nvGrpSpPr>
+        <p:cNvPr id="1" name=""/>
+        <p:cNvGrpSpPr/>
+        <p:nvPr/>
+      </p:nvGrpSpPr>
+      <p:grpSpPr>
+        <a:xfrm>
+          <a:off x="0" y="0"/>
+          <a:ext cx="0" cy="0"/>
+          <a:chOff x="0" y="0"/>
+          <a:chExt cx="0" cy="0"/>
+        </a:xfrm>
+      </p:grpSpPr>
+      <p:pic>
+        <p:nvPicPr>
+          <p:cNvPr id="9" name="Picture 8">
+            <a:extLst>
+              <a:ext uri="{FF2B5EF4-FFF2-40B4-BE49-F238E27FC236}">
+                <a16:creationId xmlns:a16="http://schemas.microsoft.com/office/drawing/2014/main" id="{433074F5-8857-EC4A-9A08-029C493D3D34}"/>
+              </a:ext>
+            </a:extLst>
+          </p:cNvPr>
+          <p:cNvPicPr>
+            <a:picLocks noChangeAspect="1"/>
+          </p:cNvPicPr>
+          <p:nvPr/>
+        </p:nvPicPr>
+        <p:blipFill>
+          <a:blip r:embed="rId2"/>
+          <a:stretch>
+            <a:fillRect/>
+          </a:stretch>
+        </p:blipFill>
+        <p:spPr>
+          <a:xfrm>
+            <a:off x="427811" y="1714499"/>
+            <a:ext cx="5486400" cy="3429000"/>
+          </a:xfrm>
+          <a:prstGeom prst="rect">
+            <a:avLst/>
+          </a:prstGeom>
+        </p:spPr>
+      </p:pic>
+      <p:pic>
+        <p:nvPicPr>
+          <p:cNvPr id="10" name="Picture 9">
+            <a:extLst>
+              <a:ext uri="{FF2B5EF4-FFF2-40B4-BE49-F238E27FC236}">
+                <a16:creationId xmlns:a16="http://schemas.microsoft.com/office/drawing/2014/main" id="{3C86156E-7279-DC47-B303-C6750194ECEC}"/>
+              </a:ext>
+            </a:extLst>
+          </p:cNvPr>
+          <p:cNvPicPr>
+            <a:picLocks noChangeAspect="1"/>
+          </p:cNvPicPr>
+          <p:nvPr/>
+        </p:nvPicPr>
+        <p:blipFill>
+          <a:blip r:embed="rId3"/>
+          <a:stretch>
+            <a:fillRect/>
+          </a:stretch>
+        </p:blipFill>
+        <p:spPr>
+          <a:xfrm>
+            <a:off x="6096000" y="1714499"/>
+            <a:ext cx="5486401" cy="3429001"/>
+          </a:xfrm>
+          <a:prstGeom prst="rect">
+            <a:avLst/>
+          </a:prstGeom>
+        </p:spPr>
+      </p:pic>
+    </p:spTree>
+    <p:extLst>
+      <p:ext uri="{BB962C8B-B14F-4D97-AF65-F5344CB8AC3E}">
+        <p14:creationId xmlns:p14="http://schemas.microsoft.com/office/powerpoint/2010/main" val="1589432710"/>
+      </p:ext>
+    </p:extLst>
+  </p:cSld>
+  <p:clrMapOvr>
+    <a:masterClrMapping/>
+  </p:clrMapOvr>
+</p:sld>
+</file>
+
 <file path=ppt/theme/theme1.xml><?xml version="1.0" encoding="utf-8"?>
 <a:theme xmlns:a="http://schemas.openxmlformats.org/drawingml/2006/main" name="Office Theme">
   <a:themeElements>

</xml_diff>

<commit_message>
Update font size label histogram
</commit_message>
<xml_diff>
--- a/report/gene-images.pptx
+++ b/report/gene-images.pptx
@@ -12,9 +12,9 @@
     <p:sldId id="260" r:id="rId6"/>
     <p:sldId id="261" r:id="rId7"/>
     <p:sldId id="262" r:id="rId8"/>
-    <p:sldId id="263" r:id="rId9"/>
-    <p:sldId id="265" r:id="rId10"/>
-    <p:sldId id="264" r:id="rId11"/>
+    <p:sldId id="266" r:id="rId9"/>
+    <p:sldId id="267" r:id="rId10"/>
+    <p:sldId id="268" r:id="rId11"/>
   </p:sldIdLst>
   <p:sldSz cx="12192000" cy="6858000"/>
   <p:notesSz cx="6858000" cy="9144000"/>
@@ -3544,10 +3544,10 @@
       </p:grpSpPr>
       <p:pic>
         <p:nvPicPr>
-          <p:cNvPr id="9" name="Picture 8">
+          <p:cNvPr id="4" name="Picture 3">
             <a:extLst>
               <a:ext uri="{FF2B5EF4-FFF2-40B4-BE49-F238E27FC236}">
-                <a16:creationId xmlns:a16="http://schemas.microsoft.com/office/drawing/2014/main" id="{8080C922-3E51-B046-A89F-9E809DD71D36}"/>
+                <a16:creationId xmlns:a16="http://schemas.microsoft.com/office/drawing/2014/main" id="{34643D55-9012-DC42-97E9-303BBA0813F8}"/>
               </a:ext>
             </a:extLst>
           </p:cNvPr>
@@ -3564,8 +3564,8 @@
         </p:blipFill>
         <p:spPr>
           <a:xfrm>
-            <a:off x="6096000" y="1710587"/>
-            <a:ext cx="5523470" cy="3436826"/>
+            <a:off x="444602" y="1550211"/>
+            <a:ext cx="5469607" cy="3418504"/>
           </a:xfrm>
           <a:prstGeom prst="rect">
             <a:avLst/>
@@ -3574,10 +3574,10 @@
       </p:pic>
       <p:pic>
         <p:nvPicPr>
-          <p:cNvPr id="10" name="Picture 9">
+          <p:cNvPr id="5" name="Picture 4">
             <a:extLst>
               <a:ext uri="{FF2B5EF4-FFF2-40B4-BE49-F238E27FC236}">
-                <a16:creationId xmlns:a16="http://schemas.microsoft.com/office/drawing/2014/main" id="{127D6DDB-4885-E642-94E5-F9023A3E47CA}"/>
+                <a16:creationId xmlns:a16="http://schemas.microsoft.com/office/drawing/2014/main" id="{614609FA-DDE0-0A43-A0DE-AE35B388D2C8}"/>
               </a:ext>
             </a:extLst>
           </p:cNvPr>
@@ -3594,8 +3594,8 @@
         </p:blipFill>
         <p:spPr>
           <a:xfrm>
-            <a:off x="427811" y="1718413"/>
-            <a:ext cx="5486400" cy="3429000"/>
+            <a:off x="6133068" y="1533018"/>
+            <a:ext cx="5524624" cy="3452890"/>
           </a:xfrm>
           <a:prstGeom prst="rect">
             <a:avLst/>
@@ -3605,7 +3605,7 @@
     </p:spTree>
     <p:extLst>
       <p:ext uri="{BB962C8B-B14F-4D97-AF65-F5344CB8AC3E}">
-        <p14:creationId xmlns:p14="http://schemas.microsoft.com/office/powerpoint/2010/main" val="1256629835"/>
+        <p14:creationId xmlns:p14="http://schemas.microsoft.com/office/powerpoint/2010/main" val="2480889305"/>
       </p:ext>
     </p:extLst>
   </p:cSld>
@@ -9617,10 +9617,10 @@
       </p:grpSpPr>
       <p:pic>
         <p:nvPicPr>
-          <p:cNvPr id="11" name="Picture 10">
+          <p:cNvPr id="6" name="Picture 5">
             <a:extLst>
               <a:ext uri="{FF2B5EF4-FFF2-40B4-BE49-F238E27FC236}">
-                <a16:creationId xmlns:a16="http://schemas.microsoft.com/office/drawing/2014/main" id="{00404070-3DA6-854C-8B4A-2C19018D04F9}"/>
+                <a16:creationId xmlns:a16="http://schemas.microsoft.com/office/drawing/2014/main" id="{E2718D60-204C-5C44-8F5F-55B504F5B212}"/>
               </a:ext>
             </a:extLst>
           </p:cNvPr>
@@ -9637,8 +9637,8 @@
         </p:blipFill>
         <p:spPr>
           <a:xfrm>
-            <a:off x="366165" y="1714500"/>
-            <a:ext cx="5548045" cy="3429000"/>
+            <a:off x="427811" y="1706468"/>
+            <a:ext cx="5486400" cy="3429000"/>
           </a:xfrm>
           <a:prstGeom prst="rect">
             <a:avLst/>
@@ -9647,10 +9647,10 @@
       </p:pic>
       <p:pic>
         <p:nvPicPr>
-          <p:cNvPr id="12" name="Picture 11">
+          <p:cNvPr id="7" name="Picture 6">
             <a:extLst>
               <a:ext uri="{FF2B5EF4-FFF2-40B4-BE49-F238E27FC236}">
-                <a16:creationId xmlns:a16="http://schemas.microsoft.com/office/drawing/2014/main" id="{CBE4CD19-2132-0D40-BDC1-4F1602FEA008}"/>
+                <a16:creationId xmlns:a16="http://schemas.microsoft.com/office/drawing/2014/main" id="{03582EC4-0EDF-9145-A691-AB111BC987A2}"/>
               </a:ext>
             </a:extLst>
           </p:cNvPr>
@@ -9667,8 +9667,8 @@
         </p:blipFill>
         <p:spPr>
           <a:xfrm>
-            <a:off x="6096000" y="1714500"/>
-            <a:ext cx="5486400" cy="3429000"/>
+            <a:off x="6133070" y="1694523"/>
+            <a:ext cx="5524624" cy="3452890"/>
           </a:xfrm>
           <a:prstGeom prst="rect">
             <a:avLst/>
@@ -9678,7 +9678,7 @@
     </p:spTree>
     <p:extLst>
       <p:ext uri="{BB962C8B-B14F-4D97-AF65-F5344CB8AC3E}">
-        <p14:creationId xmlns:p14="http://schemas.microsoft.com/office/powerpoint/2010/main" val="4096195565"/>
+        <p14:creationId xmlns:p14="http://schemas.microsoft.com/office/powerpoint/2010/main" val="4013736408"/>
       </p:ext>
     </p:extLst>
   </p:cSld>
@@ -9707,10 +9707,10 @@
       </p:grpSpPr>
       <p:pic>
         <p:nvPicPr>
-          <p:cNvPr id="9" name="Picture 8">
+          <p:cNvPr id="4" name="Picture 3">
             <a:extLst>
               <a:ext uri="{FF2B5EF4-FFF2-40B4-BE49-F238E27FC236}">
-                <a16:creationId xmlns:a16="http://schemas.microsoft.com/office/drawing/2014/main" id="{433074F5-8857-EC4A-9A08-029C493D3D34}"/>
+                <a16:creationId xmlns:a16="http://schemas.microsoft.com/office/drawing/2014/main" id="{F985ADB9-5BBE-6E48-AA8E-2E1A3FD34869}"/>
               </a:ext>
             </a:extLst>
           </p:cNvPr>
@@ -9727,8 +9727,8 @@
         </p:blipFill>
         <p:spPr>
           <a:xfrm>
-            <a:off x="427811" y="1714499"/>
-            <a:ext cx="5486400" cy="3429000"/>
+            <a:off x="6133068" y="1578988"/>
+            <a:ext cx="5524624" cy="3452890"/>
           </a:xfrm>
           <a:prstGeom prst="rect">
             <a:avLst/>
@@ -9737,10 +9737,10 @@
       </p:pic>
       <p:pic>
         <p:nvPicPr>
-          <p:cNvPr id="10" name="Picture 9">
+          <p:cNvPr id="5" name="Picture 4">
             <a:extLst>
               <a:ext uri="{FF2B5EF4-FFF2-40B4-BE49-F238E27FC236}">
-                <a16:creationId xmlns:a16="http://schemas.microsoft.com/office/drawing/2014/main" id="{3C86156E-7279-DC47-B303-C6750194ECEC}"/>
+                <a16:creationId xmlns:a16="http://schemas.microsoft.com/office/drawing/2014/main" id="{7997CDB0-A79F-2047-906B-38045CB32F54}"/>
               </a:ext>
             </a:extLst>
           </p:cNvPr>
@@ -9757,8 +9757,8 @@
         </p:blipFill>
         <p:spPr>
           <a:xfrm>
-            <a:off x="6096000" y="1714499"/>
-            <a:ext cx="5486401" cy="3429001"/>
+            <a:off x="427810" y="1590934"/>
+            <a:ext cx="5486399" cy="3428999"/>
           </a:xfrm>
           <a:prstGeom prst="rect">
             <a:avLst/>
@@ -9768,7 +9768,7 @@
     </p:spTree>
     <p:extLst>
       <p:ext uri="{BB962C8B-B14F-4D97-AF65-F5344CB8AC3E}">
-        <p14:creationId xmlns:p14="http://schemas.microsoft.com/office/powerpoint/2010/main" val="1589432710"/>
+        <p14:creationId xmlns:p14="http://schemas.microsoft.com/office/powerpoint/2010/main" val="1209897756"/>
       </p:ext>
     </p:extLst>
   </p:cSld>

</xml_diff>

<commit_message>
Upload script and datasets
</commit_message>
<xml_diff>
--- a/report/gene-images.pptx
+++ b/report/gene-images.pptx
@@ -15,6 +15,7 @@
     <p:sldId id="266" r:id="rId9"/>
     <p:sldId id="267" r:id="rId10"/>
     <p:sldId id="268" r:id="rId11"/>
+    <p:sldId id="270" r:id="rId12"/>
   </p:sldIdLst>
   <p:sldSz cx="12192000" cy="6858000"/>
   <p:notesSz cx="6858000" cy="9144000"/>
@@ -3615,6 +3616,216 @@
 </p:sld>
 </file>
 
+<file path=ppt/slides/slide11.xml><?xml version="1.0" encoding="utf-8"?>
+<p:sld xmlns:a="http://schemas.openxmlformats.org/drawingml/2006/main" xmlns:r="http://schemas.openxmlformats.org/officeDocument/2006/relationships" xmlns:p="http://schemas.openxmlformats.org/presentationml/2006/main">
+  <p:cSld>
+    <p:spTree>
+      <p:nvGrpSpPr>
+        <p:cNvPr id="1" name=""/>
+        <p:cNvGrpSpPr/>
+        <p:nvPr/>
+      </p:nvGrpSpPr>
+      <p:grpSpPr>
+        <a:xfrm>
+          <a:off x="0" y="0"/>
+          <a:ext cx="0" cy="0"/>
+          <a:chOff x="0" y="0"/>
+          <a:chExt cx="0" cy="0"/>
+        </a:xfrm>
+      </p:grpSpPr>
+      <p:pic>
+        <p:nvPicPr>
+          <p:cNvPr id="4" name="Picture 3">
+            <a:extLst>
+              <a:ext uri="{FF2B5EF4-FFF2-40B4-BE49-F238E27FC236}">
+                <a16:creationId xmlns:a16="http://schemas.microsoft.com/office/drawing/2014/main" id="{61CA2EDD-D946-3F49-BA91-C7755880859E}"/>
+              </a:ext>
+            </a:extLst>
+          </p:cNvPr>
+          <p:cNvPicPr>
+            <a:picLocks noChangeAspect="1"/>
+          </p:cNvPicPr>
+          <p:nvPr/>
+        </p:nvPicPr>
+        <p:blipFill>
+          <a:blip r:embed="rId2"/>
+          <a:stretch>
+            <a:fillRect/>
+          </a:stretch>
+        </p:blipFill>
+        <p:spPr>
+          <a:xfrm>
+            <a:off x="2084055" y="585132"/>
+            <a:ext cx="2724152" cy="1702595"/>
+          </a:xfrm>
+          <a:prstGeom prst="rect">
+            <a:avLst/>
+          </a:prstGeom>
+        </p:spPr>
+      </p:pic>
+      <p:pic>
+        <p:nvPicPr>
+          <p:cNvPr id="5" name="Picture 4">
+            <a:extLst>
+              <a:ext uri="{FF2B5EF4-FFF2-40B4-BE49-F238E27FC236}">
+                <a16:creationId xmlns:a16="http://schemas.microsoft.com/office/drawing/2014/main" id="{F237D25B-2377-DA42-A71A-690F9302289C}"/>
+              </a:ext>
+            </a:extLst>
+          </p:cNvPr>
+          <p:cNvPicPr>
+            <a:picLocks noChangeAspect="1"/>
+          </p:cNvPicPr>
+          <p:nvPr/>
+        </p:nvPicPr>
+        <p:blipFill>
+          <a:blip r:embed="rId3"/>
+          <a:stretch>
+            <a:fillRect/>
+          </a:stretch>
+        </p:blipFill>
+        <p:spPr>
+          <a:xfrm>
+            <a:off x="4959267" y="579201"/>
+            <a:ext cx="2743132" cy="1714457"/>
+          </a:xfrm>
+          <a:prstGeom prst="rect">
+            <a:avLst/>
+          </a:prstGeom>
+        </p:spPr>
+      </p:pic>
+      <p:pic>
+        <p:nvPicPr>
+          <p:cNvPr id="6" name="Picture 5">
+            <a:extLst>
+              <a:ext uri="{FF2B5EF4-FFF2-40B4-BE49-F238E27FC236}">
+                <a16:creationId xmlns:a16="http://schemas.microsoft.com/office/drawing/2014/main" id="{5DB22576-6466-5747-9929-5EBA52401243}"/>
+              </a:ext>
+            </a:extLst>
+          </p:cNvPr>
+          <p:cNvPicPr>
+            <a:picLocks noChangeAspect="1"/>
+          </p:cNvPicPr>
+          <p:nvPr/>
+        </p:nvPicPr>
+        <p:blipFill>
+          <a:blip r:embed="rId4"/>
+          <a:stretch>
+            <a:fillRect/>
+          </a:stretch>
+        </p:blipFill>
+        <p:spPr>
+          <a:xfrm>
+            <a:off x="4959267" y="2348310"/>
+            <a:ext cx="2743132" cy="1714457"/>
+          </a:xfrm>
+          <a:prstGeom prst="rect">
+            <a:avLst/>
+          </a:prstGeom>
+        </p:spPr>
+      </p:pic>
+      <p:pic>
+        <p:nvPicPr>
+          <p:cNvPr id="7" name="Picture 6">
+            <a:extLst>
+              <a:ext uri="{FF2B5EF4-FFF2-40B4-BE49-F238E27FC236}">
+                <a16:creationId xmlns:a16="http://schemas.microsoft.com/office/drawing/2014/main" id="{D74DFA8A-0B7A-8A46-9184-F529CDFD9EC0}"/>
+              </a:ext>
+            </a:extLst>
+          </p:cNvPr>
+          <p:cNvPicPr>
+            <a:picLocks noChangeAspect="1"/>
+          </p:cNvPicPr>
+          <p:nvPr/>
+        </p:nvPicPr>
+        <p:blipFill>
+          <a:blip r:embed="rId5"/>
+          <a:stretch>
+            <a:fillRect/>
+          </a:stretch>
+        </p:blipFill>
+        <p:spPr>
+          <a:xfrm>
+            <a:off x="2084055" y="2354241"/>
+            <a:ext cx="2724152" cy="1702595"/>
+          </a:xfrm>
+          <a:prstGeom prst="rect">
+            <a:avLst/>
+          </a:prstGeom>
+        </p:spPr>
+      </p:pic>
+      <p:pic>
+        <p:nvPicPr>
+          <p:cNvPr id="8" name="Picture 7">
+            <a:extLst>
+              <a:ext uri="{FF2B5EF4-FFF2-40B4-BE49-F238E27FC236}">
+                <a16:creationId xmlns:a16="http://schemas.microsoft.com/office/drawing/2014/main" id="{DF410FDE-08DF-D649-8EF2-0322630A6E4C}"/>
+              </a:ext>
+            </a:extLst>
+          </p:cNvPr>
+          <p:cNvPicPr>
+            <a:picLocks noChangeAspect="1"/>
+          </p:cNvPicPr>
+          <p:nvPr/>
+        </p:nvPicPr>
+        <p:blipFill>
+          <a:blip r:embed="rId6"/>
+          <a:stretch>
+            <a:fillRect/>
+          </a:stretch>
+        </p:blipFill>
+        <p:spPr>
+          <a:xfrm>
+            <a:off x="2088224" y="4125955"/>
+            <a:ext cx="2715814" cy="1697384"/>
+          </a:xfrm>
+          <a:prstGeom prst="rect">
+            <a:avLst/>
+          </a:prstGeom>
+        </p:spPr>
+      </p:pic>
+      <p:pic>
+        <p:nvPicPr>
+          <p:cNvPr id="9" name="Picture 8">
+            <a:extLst>
+              <a:ext uri="{FF2B5EF4-FFF2-40B4-BE49-F238E27FC236}">
+                <a16:creationId xmlns:a16="http://schemas.microsoft.com/office/drawing/2014/main" id="{21362067-EE3C-F847-A383-56FF3D8CEF46}"/>
+              </a:ext>
+            </a:extLst>
+          </p:cNvPr>
+          <p:cNvPicPr>
+            <a:picLocks noChangeAspect="1"/>
+          </p:cNvPicPr>
+          <p:nvPr/>
+        </p:nvPicPr>
+        <p:blipFill>
+          <a:blip r:embed="rId7"/>
+          <a:stretch>
+            <a:fillRect/>
+          </a:stretch>
+        </p:blipFill>
+        <p:spPr>
+          <a:xfrm>
+            <a:off x="4959267" y="4117419"/>
+            <a:ext cx="2743132" cy="1714457"/>
+          </a:xfrm>
+          <a:prstGeom prst="rect">
+            <a:avLst/>
+          </a:prstGeom>
+        </p:spPr>
+      </p:pic>
+    </p:spTree>
+    <p:extLst>
+      <p:ext uri="{BB962C8B-B14F-4D97-AF65-F5344CB8AC3E}">
+        <p14:creationId xmlns:p14="http://schemas.microsoft.com/office/powerpoint/2010/main" val="45752445"/>
+      </p:ext>
+    </p:extLst>
+  </p:cSld>
+  <p:clrMapOvr>
+    <a:masterClrMapping/>
+  </p:clrMapOvr>
+</p:sld>
+</file>
+
 <file path=ppt/slides/slide2.xml><?xml version="1.0" encoding="utf-8"?>
 <p:sld xmlns:a="http://schemas.openxmlformats.org/drawingml/2006/main" xmlns:r="http://schemas.openxmlformats.org/officeDocument/2006/relationships" xmlns:p="http://schemas.openxmlformats.org/presentationml/2006/main">
   <p:cSld>

</xml_diff>